<commit_message>
new layout for index.html
</commit_message>
<xml_diff>
--- a/img/ppt/ucc-logo.pptx
+++ b/img/ppt/ucc-logo.pptx
@@ -245,7 +245,7 @@
           <a:p>
             <a:fld id="{6AB5763C-D1B2-4964-B6FE-59759B5D5EAB}" type="datetimeFigureOut">
               <a:rPr lang="en-US" smtClean="0"/>
-              <a:t>11/9/2017</a:t>
+              <a:t>4/12/2018</a:t>
             </a:fld>
             <a:endParaRPr lang="en-US"/>
           </a:p>
@@ -415,7 +415,7 @@
           <a:p>
             <a:fld id="{6AB5763C-D1B2-4964-B6FE-59759B5D5EAB}" type="datetimeFigureOut">
               <a:rPr lang="en-US" smtClean="0"/>
-              <a:t>11/9/2017</a:t>
+              <a:t>4/12/2018</a:t>
             </a:fld>
             <a:endParaRPr lang="en-US"/>
           </a:p>
@@ -595,7 +595,7 @@
           <a:p>
             <a:fld id="{6AB5763C-D1B2-4964-B6FE-59759B5D5EAB}" type="datetimeFigureOut">
               <a:rPr lang="en-US" smtClean="0"/>
-              <a:t>11/9/2017</a:t>
+              <a:t>4/12/2018</a:t>
             </a:fld>
             <a:endParaRPr lang="en-US"/>
           </a:p>
@@ -765,7 +765,7 @@
           <a:p>
             <a:fld id="{6AB5763C-D1B2-4964-B6FE-59759B5D5EAB}" type="datetimeFigureOut">
               <a:rPr lang="en-US" smtClean="0"/>
-              <a:t>11/9/2017</a:t>
+              <a:t>4/12/2018</a:t>
             </a:fld>
             <a:endParaRPr lang="en-US"/>
           </a:p>
@@ -1011,7 +1011,7 @@
           <a:p>
             <a:fld id="{6AB5763C-D1B2-4964-B6FE-59759B5D5EAB}" type="datetimeFigureOut">
               <a:rPr lang="en-US" smtClean="0"/>
-              <a:t>11/9/2017</a:t>
+              <a:t>4/12/2018</a:t>
             </a:fld>
             <a:endParaRPr lang="en-US"/>
           </a:p>
@@ -1243,7 +1243,7 @@
           <a:p>
             <a:fld id="{6AB5763C-D1B2-4964-B6FE-59759B5D5EAB}" type="datetimeFigureOut">
               <a:rPr lang="en-US" smtClean="0"/>
-              <a:t>11/9/2017</a:t>
+              <a:t>4/12/2018</a:t>
             </a:fld>
             <a:endParaRPr lang="en-US"/>
           </a:p>
@@ -1610,7 +1610,7 @@
           <a:p>
             <a:fld id="{6AB5763C-D1B2-4964-B6FE-59759B5D5EAB}" type="datetimeFigureOut">
               <a:rPr lang="en-US" smtClean="0"/>
-              <a:t>11/9/2017</a:t>
+              <a:t>4/12/2018</a:t>
             </a:fld>
             <a:endParaRPr lang="en-US"/>
           </a:p>
@@ -1728,7 +1728,7 @@
           <a:p>
             <a:fld id="{6AB5763C-D1B2-4964-B6FE-59759B5D5EAB}" type="datetimeFigureOut">
               <a:rPr lang="en-US" smtClean="0"/>
-              <a:t>11/9/2017</a:t>
+              <a:t>4/12/2018</a:t>
             </a:fld>
             <a:endParaRPr lang="en-US"/>
           </a:p>
@@ -1823,7 +1823,7 @@
           <a:p>
             <a:fld id="{6AB5763C-D1B2-4964-B6FE-59759B5D5EAB}" type="datetimeFigureOut">
               <a:rPr lang="en-US" smtClean="0"/>
-              <a:t>11/9/2017</a:t>
+              <a:t>4/12/2018</a:t>
             </a:fld>
             <a:endParaRPr lang="en-US"/>
           </a:p>
@@ -2100,7 +2100,7 @@
           <a:p>
             <a:fld id="{6AB5763C-D1B2-4964-B6FE-59759B5D5EAB}" type="datetimeFigureOut">
               <a:rPr lang="en-US" smtClean="0"/>
-              <a:t>11/9/2017</a:t>
+              <a:t>4/12/2018</a:t>
             </a:fld>
             <a:endParaRPr lang="en-US"/>
           </a:p>
@@ -2353,7 +2353,7 @@
           <a:p>
             <a:fld id="{6AB5763C-D1B2-4964-B6FE-59759B5D5EAB}" type="datetimeFigureOut">
               <a:rPr lang="en-US" smtClean="0"/>
-              <a:t>11/9/2017</a:t>
+              <a:t>4/12/2018</a:t>
             </a:fld>
             <a:endParaRPr lang="en-US"/>
           </a:p>
@@ -2566,7 +2566,7 @@
           <a:p>
             <a:fld id="{6AB5763C-D1B2-4964-B6FE-59759B5D5EAB}" type="datetimeFigureOut">
               <a:rPr lang="en-US" smtClean="0"/>
-              <a:t>11/9/2017</a:t>
+              <a:t>4/12/2018</a:t>
             </a:fld>
             <a:endParaRPr lang="en-US"/>
           </a:p>
@@ -2973,16 +2973,16 @@
       </p:grpSpPr>
       <p:grpSp>
         <p:nvGrpSpPr>
-          <p:cNvPr id="17" name="Group 16"/>
+          <p:cNvPr id="11" name="Group 10"/>
           <p:cNvGrpSpPr/>
           <p:nvPr/>
         </p:nvGrpSpPr>
         <p:grpSpPr>
           <a:xfrm>
-            <a:off x="3883218" y="2911930"/>
-            <a:ext cx="4448007" cy="1034140"/>
-            <a:chOff x="3897966" y="2476492"/>
-            <a:chExt cx="4448007" cy="1034140"/>
+            <a:off x="4097131" y="1857452"/>
+            <a:ext cx="3997739" cy="1262669"/>
+            <a:chOff x="4209070" y="1857452"/>
+            <a:chExt cx="3997739" cy="1262669"/>
           </a:xfrm>
         </p:grpSpPr>
         <p:pic>
@@ -2993,7 +2993,7 @@
             </p:cNvPicPr>
             <p:nvPr/>
           </p:nvPicPr>
-          <p:blipFill>
+          <p:blipFill rotWithShape="1">
             <a:blip r:embed="rId2">
               <a:extLst>
                 <a:ext uri="{28A0092B-C50C-407E-A947-70E740481C1C}">
@@ -3001,14 +3001,13 @@
                 </a:ext>
               </a:extLst>
             </a:blip>
-            <a:stretch>
-              <a:fillRect/>
-            </a:stretch>
+            <a:srcRect l="26976" r="28033"/>
+            <a:stretch/>
           </p:blipFill>
           <p:spPr>
             <a:xfrm>
-              <a:off x="3897966" y="2476492"/>
-              <a:ext cx="1930395" cy="1034140"/>
+              <a:off x="4209070" y="1857452"/>
+              <a:ext cx="1060450" cy="1262669"/>
             </a:xfrm>
             <a:prstGeom prst="rect">
               <a:avLst/>
@@ -3023,111 +3022,141 @@
           </p:nvGrpSpPr>
           <p:grpSpPr>
             <a:xfrm>
-              <a:off x="4803723" y="2581911"/>
-              <a:ext cx="3542250" cy="823303"/>
-              <a:chOff x="4501721" y="2686557"/>
-              <a:chExt cx="3542250" cy="823303"/>
+              <a:off x="5174003" y="2035800"/>
+              <a:ext cx="3032806" cy="905973"/>
+              <a:chOff x="7128919" y="590419"/>
+              <a:chExt cx="3032806" cy="905973"/>
             </a:xfrm>
           </p:grpSpPr>
-          <p:sp>
-            <p:nvSpPr>
-              <p:cNvPr id="2" name="TextBox 1"/>
-              <p:cNvSpPr txBox="1"/>
+          <p:grpSp>
+            <p:nvGrpSpPr>
+              <p:cNvPr id="8" name="Group 7"/>
+              <p:cNvGrpSpPr/>
               <p:nvPr/>
-            </p:nvSpPr>
-            <p:spPr>
+            </p:nvGrpSpPr>
+            <p:grpSpPr>
               <a:xfrm>
-                <a:off x="4501721" y="2686557"/>
-                <a:ext cx="2034403" cy="523220"/>
+                <a:off x="7128919" y="590419"/>
+                <a:ext cx="3032806" cy="589268"/>
+                <a:chOff x="7128919" y="590419"/>
+                <a:chExt cx="3032806" cy="589268"/>
               </a:xfrm>
-              <a:prstGeom prst="rect">
-                <a:avLst/>
-              </a:prstGeom>
-              <a:noFill/>
-            </p:spPr>
-            <p:txBody>
-              <a:bodyPr wrap="none" lIns="512064" rIns="512064" rtlCol="0">
-                <a:spAutoFit/>
-              </a:bodyPr>
-              <a:lstStyle/>
-              <a:p>
-                <a:r>
-                  <a:rPr lang="en-US" sz="2800" cap="small" dirty="0" smtClean="0">
-                    <a:latin typeface="Raleway" panose="020B0503030101060003" pitchFamily="34" charset="0"/>
-                  </a:rPr>
-                  <a:t>Union</a:t>
-                </a:r>
-                <a:endParaRPr lang="en-US" sz="2800" cap="small" dirty="0">
-                  <a:latin typeface="Raleway" panose="020B0503030101060003" pitchFamily="34" charset="0"/>
-                </a:endParaRPr>
-              </a:p>
-            </p:txBody>
-          </p:sp>
-          <p:sp>
-            <p:nvSpPr>
-              <p:cNvPr id="3" name="TextBox 2"/>
-              <p:cNvSpPr txBox="1"/>
-              <p:nvPr/>
-            </p:nvSpPr>
-            <p:spPr>
-              <a:xfrm>
-                <a:off x="5526361" y="2786585"/>
-                <a:ext cx="1434880" cy="323165"/>
-              </a:xfrm>
-              <a:prstGeom prst="rect">
-                <a:avLst/>
-              </a:prstGeom>
-              <a:noFill/>
-            </p:spPr>
-            <p:txBody>
-              <a:bodyPr wrap="none" lIns="512064" rIns="512064" rtlCol="0">
-                <a:spAutoFit/>
-              </a:bodyPr>
-              <a:lstStyle/>
-              <a:p>
-                <a:r>
-                  <a:rPr lang="en-US" sz="1500" dirty="0" smtClean="0">
-                    <a:latin typeface="Raleway" panose="020B0503030101060003" pitchFamily="34" charset="0"/>
-                  </a:rPr>
-                  <a:t>with</a:t>
-                </a:r>
-                <a:endParaRPr lang="en-US" sz="1500" dirty="0">
-                  <a:latin typeface="Raleway" panose="020B0503030101060003" pitchFamily="34" charset="0"/>
-                </a:endParaRPr>
-              </a:p>
-            </p:txBody>
-          </p:sp>
-          <p:sp>
-            <p:nvSpPr>
-              <p:cNvPr id="4" name="TextBox 3"/>
-              <p:cNvSpPr txBox="1"/>
-              <p:nvPr/>
-            </p:nvSpPr>
-            <p:spPr>
-              <a:xfrm>
-                <a:off x="5921402" y="2686557"/>
-                <a:ext cx="2122569" cy="523220"/>
-              </a:xfrm>
-              <a:prstGeom prst="rect">
-                <a:avLst/>
-              </a:prstGeom>
-              <a:noFill/>
-            </p:spPr>
-            <p:txBody>
-              <a:bodyPr wrap="none" lIns="512064" rIns="512064" rtlCol="0">
-                <a:spAutoFit/>
-              </a:bodyPr>
-              <a:lstStyle/>
-              <a:p>
-                <a:r>
-                  <a:rPr lang="en-US" sz="2800" cap="small" dirty="0">
-                    <a:latin typeface="Raleway" panose="020B0503030101060003" pitchFamily="34" charset="0"/>
-                  </a:rPr>
-                  <a:t>Christ</a:t>
-                </a:r>
-              </a:p>
-            </p:txBody>
-          </p:sp>
+            </p:grpSpPr>
+            <p:sp>
+              <p:nvSpPr>
+                <p:cNvPr id="2" name="TextBox 1"/>
+                <p:cNvSpPr txBox="1"/>
+                <p:nvPr/>
+              </p:nvSpPr>
+              <p:spPr>
+                <a:xfrm>
+                  <a:off x="7128919" y="594912"/>
+                  <a:ext cx="1343638" cy="584775"/>
+                </a:xfrm>
+                <a:prstGeom prst="rect">
+                  <a:avLst/>
+                </a:prstGeom>
+                <a:noFill/>
+              </p:spPr>
+              <p:txBody>
+                <a:bodyPr wrap="none" lIns="91440" rIns="91440" rtlCol="0">
+                  <a:spAutoFit/>
+                </a:bodyPr>
+                <a:lstStyle/>
+                <a:p>
+                  <a:r>
+                    <a:rPr lang="en-US" sz="3200" cap="small" dirty="0" smtClean="0">
+                      <a:solidFill>
+                        <a:schemeClr val="bg1"/>
+                      </a:solidFill>
+                      <a:latin typeface="Lato" panose="020F0502020204030203" pitchFamily="34" charset="0"/>
+                    </a:rPr>
+                    <a:t>Union</a:t>
+                  </a:r>
+                  <a:endParaRPr lang="en-US" sz="3200" cap="small" dirty="0">
+                    <a:solidFill>
+                      <a:schemeClr val="bg1"/>
+                    </a:solidFill>
+                    <a:latin typeface="Lato" panose="020F0502020204030203" pitchFamily="34" charset="0"/>
+                  </a:endParaRPr>
+                </a:p>
+              </p:txBody>
+            </p:sp>
+            <p:sp>
+              <p:nvSpPr>
+                <p:cNvPr id="3" name="TextBox 2"/>
+                <p:cNvSpPr txBox="1"/>
+                <p:nvPr/>
+              </p:nvSpPr>
+              <p:spPr>
+                <a:xfrm>
+                  <a:off x="8311939" y="721224"/>
+                  <a:ext cx="585417" cy="338554"/>
+                </a:xfrm>
+                <a:prstGeom prst="rect">
+                  <a:avLst/>
+                </a:prstGeom>
+                <a:noFill/>
+              </p:spPr>
+              <p:txBody>
+                <a:bodyPr wrap="none" lIns="91440" rIns="91440" rtlCol="0">
+                  <a:spAutoFit/>
+                </a:bodyPr>
+                <a:lstStyle/>
+                <a:p>
+                  <a:r>
+                    <a:rPr lang="en-US" sz="1600" dirty="0" smtClean="0">
+                      <a:solidFill>
+                        <a:schemeClr val="bg1"/>
+                      </a:solidFill>
+                      <a:latin typeface="Lato" panose="020F0502020204030203" pitchFamily="34" charset="0"/>
+                    </a:rPr>
+                    <a:t>with</a:t>
+                  </a:r>
+                  <a:endParaRPr lang="en-US" sz="1600" dirty="0">
+                    <a:solidFill>
+                      <a:schemeClr val="bg1"/>
+                    </a:solidFill>
+                    <a:latin typeface="Lato" panose="020F0502020204030203" pitchFamily="34" charset="0"/>
+                  </a:endParaRPr>
+                </a:p>
+              </p:txBody>
+            </p:sp>
+            <p:sp>
+              <p:nvSpPr>
+                <p:cNvPr id="4" name="TextBox 3"/>
+                <p:cNvSpPr txBox="1"/>
+                <p:nvPr/>
+              </p:nvSpPr>
+              <p:spPr>
+                <a:xfrm>
+                  <a:off x="8757173" y="590419"/>
+                  <a:ext cx="1404552" cy="584775"/>
+                </a:xfrm>
+                <a:prstGeom prst="rect">
+                  <a:avLst/>
+                </a:prstGeom>
+                <a:noFill/>
+              </p:spPr>
+              <p:txBody>
+                <a:bodyPr wrap="none" lIns="91440" rIns="91440" rtlCol="0">
+                  <a:spAutoFit/>
+                </a:bodyPr>
+                <a:lstStyle/>
+                <a:p>
+                  <a:r>
+                    <a:rPr lang="en-US" sz="3200" cap="small" dirty="0">
+                      <a:solidFill>
+                        <a:schemeClr val="bg1"/>
+                      </a:solidFill>
+                      <a:latin typeface="Lato" panose="020F0502020204030203" pitchFamily="34" charset="0"/>
+                    </a:rPr>
+                    <a:t>Christ</a:t>
+                  </a:r>
+                </a:p>
+              </p:txBody>
+            </p:sp>
+          </p:grpSp>
           <p:sp>
             <p:nvSpPr>
               <p:cNvPr id="5" name="TextBox 4"/>
@@ -3136,8 +3165,8 @@
             </p:nvSpPr>
             <p:spPr>
               <a:xfrm>
-                <a:off x="4560551" y="3109750"/>
-                <a:ext cx="3412986" cy="400110"/>
+                <a:off x="7170399" y="1034727"/>
+                <a:ext cx="2821606" cy="461665"/>
               </a:xfrm>
               <a:prstGeom prst="rect">
                 <a:avLst/>
@@ -3145,19 +3174,25 @@
               <a:noFill/>
             </p:spPr>
             <p:txBody>
-              <a:bodyPr wrap="none" lIns="512064" rIns="512064" rtlCol="0">
+              <a:bodyPr wrap="none" lIns="91440" rIns="91440" rtlCol="0">
                 <a:spAutoFit/>
               </a:bodyPr>
               <a:lstStyle/>
               <a:p>
                 <a:r>
-                  <a:rPr lang="en-US" sz="2000" dirty="0" smtClean="0">
-                    <a:latin typeface="Raleway" panose="020B0503030101060003" pitchFamily="34" charset="0"/>
+                  <a:rPr lang="en-US" sz="2400" dirty="0" smtClean="0">
+                    <a:solidFill>
+                      <a:schemeClr val="bg1"/>
+                    </a:solidFill>
+                    <a:latin typeface="Lato" panose="020F0502020204030203" pitchFamily="34" charset="0"/>
                   </a:rPr>
                   <a:t>Community Church</a:t>
                 </a:r>
-                <a:endParaRPr lang="en-US" sz="2000" dirty="0">
-                  <a:latin typeface="Raleway" panose="020B0503030101060003" pitchFamily="34" charset="0"/>
+                <a:endParaRPr lang="en-US" sz="2400" dirty="0">
+                  <a:solidFill>
+                    <a:schemeClr val="bg1"/>
+                  </a:solidFill>
+                  <a:latin typeface="Lato" panose="020F0502020204030203" pitchFamily="34" charset="0"/>
                 </a:endParaRPr>
               </a:p>
             </p:txBody>
@@ -3172,7 +3207,7 @@
         </p:nvGrpSpPr>
         <p:grpSpPr>
           <a:xfrm>
-            <a:off x="3883218" y="3946070"/>
+            <a:off x="3871997" y="4475120"/>
             <a:ext cx="4448007" cy="1034140"/>
             <a:chOff x="3897966" y="2476492"/>
             <a:chExt cx="4448007" cy="1034140"/>

</xml_diff>